<commit_message>
correção do link da fonte
</commit_message>
<xml_diff>
--- a/documentacao.pptx
+++ b/documentacao.pptx
@@ -220,6 +220,30 @@
             <ac:spMk id="2" creationId="{00000000-0000-0000-0000-000000000000}"/>
           </ac:spMkLst>
         </pc:spChg>
+      </pc:sldChg>
+    </pc:docChg>
+  </pc:docChgLst>
+  <pc:docChgLst>
+    <pc:chgData name="Kewen Silva" userId="c20f45175029fc16" providerId="Windows Live" clId="Web-{C780FAA2-6594-45D4-B7D9-EC13DE654DA2}"/>
+    <pc:docChg chg="modSld">
+      <pc:chgData name="Kewen Silva" userId="c20f45175029fc16" providerId="Windows Live" clId="Web-{C780FAA2-6594-45D4-B7D9-EC13DE654DA2}" dt="2022-10-31T12:45:46.164" v="1" actId="20577"/>
+      <pc:docMkLst>
+        <pc:docMk/>
+      </pc:docMkLst>
+      <pc:sldChg chg="modSp">
+        <pc:chgData name="Kewen Silva" userId="c20f45175029fc16" providerId="Windows Live" clId="Web-{C780FAA2-6594-45D4-B7D9-EC13DE654DA2}" dt="2022-10-31T12:45:46.164" v="1" actId="20577"/>
+        <pc:sldMkLst>
+          <pc:docMk/>
+          <pc:sldMk cId="1233775350" sldId="274"/>
+        </pc:sldMkLst>
+        <pc:graphicFrameChg chg="modGraphic">
+          <ac:chgData name="Kewen Silva" userId="c20f45175029fc16" providerId="Windows Live" clId="Web-{C780FAA2-6594-45D4-B7D9-EC13DE654DA2}" dt="2022-10-31T12:45:46.164" v="1" actId="20577"/>
+          <ac:graphicFrameMkLst>
+            <pc:docMk/>
+            <pc:sldMk cId="1233775350" sldId="274"/>
+            <ac:graphicFrameMk id="49" creationId="{BF2ED9B1-6407-AB7C-D1F1-32959C000B2E}"/>
+          </ac:graphicFrameMkLst>
+        </pc:graphicFrameChg>
       </pc:sldChg>
     </pc:docChg>
   </pc:docChgLst>
@@ -1030,16 +1054,13 @@
         <a:lstStyle/>
         <a:p>
           <a:r>
-            <a:rPr lang="en-US"/>
-            <a:t>Calorias: </a:t>
+            <a:rPr lang="en-US" dirty="0" err="1"/>
+            <a:t>Calorias</a:t>
           </a:r>
           <a:r>
-            <a:rPr lang="en-US">
-              <a:hlinkClick xmlns:r="http://schemas.openxmlformats.org/officeDocument/2006/relationships" r:id="rId1"/>
-            </a:rPr>
-            <a:t>https://www.feitodeiridium.com.br/como-calcular-sua-necessidade-de-macro-e-micronutrientes/</a:t>
+            <a:rPr lang="en-US" dirty="0"/>
+            <a:t>: https://www.tuasaude.com/como-calcular-o-gasto-calorico/</a:t>
           </a:r>
-          <a:endParaRPr lang="en-US"/>
         </a:p>
       </dgm:t>
     </dgm:pt>
@@ -1073,16 +1094,20 @@
         <a:lstStyle/>
         <a:p>
           <a:r>
-            <a:rPr lang="en-US"/>
-            <a:t>Macronutrientes: </a:t>
+            <a:rPr lang="en-US" dirty="0" err="1"/>
+            <a:t>Macronutrientes</a:t>
           </a:r>
           <a:r>
-            <a:rPr lang="en-US">
+            <a:rPr lang="en-US" dirty="0"/>
+            <a:t>: </a:t>
+          </a:r>
+          <a:r>
+            <a:rPr lang="en-US" dirty="0">
               <a:hlinkClick xmlns:r="http://schemas.openxmlformats.org/officeDocument/2006/relationships" r:id="rId1"/>
             </a:rPr>
             <a:t>https://www.feitodeiridium.com.br/como-calcular-sua-necessidade-de-macro-e-micronutrientes/</a:t>
           </a:r>
-          <a:endParaRPr lang="en-US"/>
+          <a:endParaRPr lang="en-US" dirty="0"/>
         </a:p>
       </dgm:t>
     </dgm:pt>
@@ -1284,16 +1309,13 @@
             <a:buNone/>
           </a:pPr>
           <a:r>
-            <a:rPr lang="en-US" sz="1800" kern="1200"/>
-            <a:t>Calorias: </a:t>
+            <a:rPr lang="en-US" sz="1800" kern="1200" dirty="0" err="1"/>
+            <a:t>Calorias</a:t>
           </a:r>
           <a:r>
-            <a:rPr lang="en-US" sz="1800" kern="1200">
-              <a:hlinkClick xmlns:r="http://schemas.openxmlformats.org/officeDocument/2006/relationships" r:id="rId1"/>
-            </a:rPr>
-            <a:t>https://www.feitodeiridium.com.br/como-calcular-sua-necessidade-de-macro-e-micronutrientes/</a:t>
+            <a:rPr lang="en-US" sz="1800" kern="1200" dirty="0"/>
+            <a:t>: https://www.tuasaude.com/como-calcular-o-gasto-calorico/</a:t>
           </a:r>
-          <a:endParaRPr lang="en-US" sz="1800" kern="1200"/>
         </a:p>
       </dsp:txBody>
       <dsp:txXfrm>
@@ -1401,16 +1423,20 @@
             <a:buNone/>
           </a:pPr>
           <a:r>
-            <a:rPr lang="en-US" sz="1800" kern="1200"/>
-            <a:t>Macronutrientes: </a:t>
+            <a:rPr lang="en-US" sz="1800" kern="1200" dirty="0" err="1"/>
+            <a:t>Macronutrientes</a:t>
           </a:r>
           <a:r>
-            <a:rPr lang="en-US" sz="1800" kern="1200">
+            <a:rPr lang="en-US" sz="1800" kern="1200" dirty="0"/>
+            <a:t>: </a:t>
+          </a:r>
+          <a:r>
+            <a:rPr lang="en-US" sz="1800" kern="1200" dirty="0">
               <a:hlinkClick xmlns:r="http://schemas.openxmlformats.org/officeDocument/2006/relationships" r:id="rId1"/>
             </a:rPr>
             <a:t>https://www.feitodeiridium.com.br/como-calcular-sua-necessidade-de-macro-e-micronutrientes/</a:t>
           </a:r>
-          <a:endParaRPr lang="en-US" sz="1800" kern="1200"/>
+          <a:endParaRPr lang="en-US" sz="1800" kern="1200" dirty="0"/>
         </a:p>
       </dsp:txBody>
       <dsp:txXfrm>
@@ -3085,7 +3111,7 @@
           <a:p>
             <a:fld id="{72EA7947-E287-4738-8C82-07CE4F01EF03}" type="datetime2">
               <a:rPr lang="en-US" smtClean="0"/>
-              <a:t>Friday, October 28, 2022</a:t>
+              <a:t>Monday, October 31, 2022</a:t>
             </a:fld>
             <a:endParaRPr lang="en-US"/>
           </a:p>
@@ -4120,7 +4146,7 @@
           <a:p>
             <a:fld id="{EE2EBD84-71F4-4271-8C46-0D47C0A9B12E}" type="datetime2">
               <a:rPr lang="en-US" smtClean="0"/>
-              <a:t>Friday, October 28, 2022</a:t>
+              <a:t>Monday, October 31, 2022</a:t>
             </a:fld>
             <a:endParaRPr lang="en-US"/>
           </a:p>
@@ -4331,7 +4357,7 @@
           <a:p>
             <a:fld id="{ABAE0CE1-F450-4107-B2CB-17B18F8A3F4A}" type="datetime2">
               <a:rPr lang="en-US" smtClean="0"/>
-              <a:t>Friday, October 28, 2022</a:t>
+              <a:t>Monday, October 31, 2022</a:t>
             </a:fld>
             <a:endParaRPr lang="en-US"/>
           </a:p>
@@ -4994,7 +5020,7 @@
           <a:p>
             <a:fld id="{6FE8C025-CD7A-4966-867E-81CF82B15267}" type="datetime2">
               <a:rPr lang="en-US" smtClean="0"/>
-              <a:t>Friday, October 28, 2022</a:t>
+              <a:t>Monday, October 31, 2022</a:t>
             </a:fld>
             <a:endParaRPr lang="en-US"/>
           </a:p>
@@ -5613,7 +5639,7 @@
           <a:p>
             <a:fld id="{FE809929-0719-4517-94D6-FDF7F99E70F6}" type="datetime2">
               <a:rPr lang="en-US" smtClean="0"/>
-              <a:t>Friday, October 28, 2022</a:t>
+              <a:t>Monday, October 31, 2022</a:t>
             </a:fld>
             <a:endParaRPr lang="en-US"/>
           </a:p>
@@ -6728,7 +6754,7 @@
           <a:p>
             <a:fld id="{20E95673-5512-4AAA-9AEB-E00C61EC65D5}" type="datetime2">
               <a:rPr lang="en-US" smtClean="0"/>
-              <a:t>Friday, October 28, 2022</a:t>
+              <a:t>Monday, October 31, 2022</a:t>
             </a:fld>
             <a:endParaRPr lang="en-US"/>
           </a:p>
@@ -7273,7 +7299,7 @@
           <a:p>
             <a:fld id="{C13138FA-2E87-4873-8BBA-13E447C9A99A}" type="datetime2">
               <a:rPr lang="en-US" smtClean="0"/>
-              <a:t>Friday, October 28, 2022</a:t>
+              <a:t>Monday, October 31, 2022</a:t>
             </a:fld>
             <a:endParaRPr lang="en-US"/>
           </a:p>
@@ -7433,7 +7459,7 @@
           <a:p>
             <a:fld id="{D75BB40A-97BD-4BFB-B639-0BFF95FDE8B7}" type="datetime2">
               <a:rPr lang="en-US" smtClean="0"/>
-              <a:t>Friday, October 28, 2022</a:t>
+              <a:t>Monday, October 31, 2022</a:t>
             </a:fld>
             <a:endParaRPr lang="en-US"/>
           </a:p>
@@ -8468,7 +8494,7 @@
           <a:p>
             <a:fld id="{9EE9E0E3-ECF6-4CFE-8698-AEFEBCECC3C0}" type="datetime2">
               <a:rPr lang="en-US" smtClean="0"/>
-              <a:t>Friday, October 28, 2022</a:t>
+              <a:t>Monday, October 31, 2022</a:t>
             </a:fld>
             <a:endParaRPr lang="en-US"/>
           </a:p>
@@ -9112,7 +9138,7 @@
           <a:p>
             <a:fld id="{251462FC-960E-4740-921F-B36862979F21}" type="datetime2">
               <a:rPr lang="en-US" smtClean="0"/>
-              <a:t>Friday, October 28, 2022</a:t>
+              <a:t>Monday, October 31, 2022</a:t>
             </a:fld>
             <a:endParaRPr lang="en-US"/>
           </a:p>
@@ -9874,7 +9900,7 @@
           <a:p>
             <a:fld id="{E50BC9E2-CB44-4C05-9BB5-496C18A241E0}" type="datetime2">
               <a:rPr lang="en-US" smtClean="0"/>
-              <a:t>Friday, October 28, 2022</a:t>
+              <a:t>Monday, October 31, 2022</a:t>
             </a:fld>
             <a:endParaRPr lang="en-US"/>
           </a:p>
@@ -10119,7 +10145,7 @@
           <a:p>
             <a:fld id="{246CB39B-5F4C-4A7E-9BE3-AAFD45576D16}" type="datetime2">
               <a:rPr lang="en-US" smtClean="0"/>
-              <a:t>Friday, October 28, 2022</a:t>
+              <a:t>Monday, October 31, 2022</a:t>
             </a:fld>
             <a:endParaRPr lang="en-US"/>
           </a:p>

</xml_diff>